<commit_message>
Chanes in 02 lecture
</commit_message>
<xml_diff>
--- a/Week1/02-python - DS, function.pptx
+++ b/Week1/02-python - DS, function.pptx
@@ -965,7 +965,7 @@
               <a:pPr>
                 <a:defRPr/>
               </a:pPr>
-              <a:t>7/14/2021</a:t>
+              <a:t>8/18/21</a:t>
             </a:fld>
             <a:endParaRPr lang="en-US"/>
           </a:p>
@@ -1387,7 +1387,7 @@
               <a:pPr>
                 <a:defRPr/>
               </a:pPr>
-              <a:t>14-Jul-21</a:t>
+              <a:t>18-Aug-21</a:t>
             </a:fld>
             <a:endParaRPr lang="en-US"/>
           </a:p>
@@ -1563,7 +1563,7 @@
               <a:pPr>
                 <a:defRPr/>
               </a:pPr>
-              <a:t>14-Jul-21</a:t>
+              <a:t>18-Aug-21</a:t>
             </a:fld>
             <a:endParaRPr lang="en-US"/>
           </a:p>
@@ -1781,7 +1781,7 @@
               <a:pPr>
                 <a:defRPr/>
               </a:pPr>
-              <a:t>14-Jul-21</a:t>
+              <a:t>18-Aug-21</a:t>
             </a:fld>
             <a:endParaRPr lang="en-US"/>
           </a:p>
@@ -2014,7 +2014,7 @@
               <a:pPr>
                 <a:defRPr/>
               </a:pPr>
-              <a:t>14-Jul-21</a:t>
+              <a:t>18-Aug-21</a:t>
             </a:fld>
             <a:endParaRPr lang="en-US"/>
           </a:p>
@@ -2245,7 +2245,7 @@
               <a:pPr>
                 <a:defRPr/>
               </a:pPr>
-              <a:t>14-Jul-21</a:t>
+              <a:t>18-Aug-21</a:t>
             </a:fld>
             <a:endParaRPr lang="en-US"/>
           </a:p>
@@ -2514,7 +2514,7 @@
               <a:pPr>
                 <a:defRPr/>
               </a:pPr>
-              <a:t>14-Jul-21</a:t>
+              <a:t>18-Aug-21</a:t>
             </a:fld>
             <a:endParaRPr lang="en-US"/>
           </a:p>
@@ -2918,7 +2918,7 @@
               <a:pPr>
                 <a:defRPr/>
               </a:pPr>
-              <a:t>14-Jul-21</a:t>
+              <a:t>18-Aug-21</a:t>
             </a:fld>
             <a:endParaRPr lang="en-US"/>
           </a:p>
@@ -3073,7 +3073,7 @@
               <a:pPr>
                 <a:defRPr/>
               </a:pPr>
-              <a:t>14-Jul-21</a:t>
+              <a:t>18-Aug-21</a:t>
             </a:fld>
             <a:endParaRPr lang="en-US"/>
           </a:p>
@@ -3207,7 +3207,7 @@
               <a:pPr>
                 <a:defRPr/>
               </a:pPr>
-              <a:t>14-Jul-21</a:t>
+              <a:t>18-Aug-21</a:t>
             </a:fld>
             <a:endParaRPr lang="en-US"/>
           </a:p>
@@ -3522,7 +3522,7 @@
               <a:pPr>
                 <a:defRPr/>
               </a:pPr>
-              <a:t>14-Jul-21</a:t>
+              <a:t>18-Aug-21</a:t>
             </a:fld>
             <a:endParaRPr lang="en-US"/>
           </a:p>
@@ -3815,7 +3815,7 @@
               <a:pPr>
                 <a:defRPr/>
               </a:pPr>
-              <a:t>14-Jul-21</a:t>
+              <a:t>18-Aug-21</a:t>
             </a:fld>
             <a:endParaRPr lang="en-US"/>
           </a:p>
@@ -4137,7 +4137,7 @@
               <a:pPr>
                 <a:defRPr/>
               </a:pPr>
-              <a:t>14-Jul-21</a:t>
+              <a:t>18-Aug-21</a:t>
             </a:fld>
             <a:endParaRPr lang="en-US"/>
           </a:p>
@@ -25335,7 +25335,7 @@
             </a:r>
             <a:r>
               <a:rPr lang="es-ES" altLang="en-US" sz="1400" b="1" dirty="0"/>
-              <a:t> false</a:t>
+              <a:t> False</a:t>
             </a:r>
           </a:p>
           <a:p>
@@ -25358,7 +25358,7 @@
             </a:r>
             <a:r>
               <a:rPr lang="es-ES" altLang="en-US" sz="1400" b="1" dirty="0"/>
-              <a:t> true</a:t>
+              <a:t> True</a:t>
             </a:r>
           </a:p>
         </p:txBody>
@@ -28822,7 +28822,7 @@
         <p:spPr bwMode="auto">
           <a:xfrm>
             <a:off x="1066800" y="2570228"/>
-            <a:ext cx="3200400" cy="523220"/>
+            <a:ext cx="3352800" cy="738664"/>
           </a:xfrm>
           <a:prstGeom prst="rect">
             <a:avLst/>
@@ -29028,7 +29028,21 @@
             </a:pPr>
             <a:r>
               <a:rPr lang="en-US" altLang="en-US" sz="1400" b="1" dirty="0"/>
-              <a:t>Ex: apply(lambda z: z* 4, 7)</a:t>
+              <a:t>Ex: apply = lambda z: z* 4</a:t>
+            </a:r>
+          </a:p>
+          <a:p>
+            <a:pPr>
+              <a:spcBef>
+                <a:spcPct val="0"/>
+              </a:spcBef>
+              <a:buClrTx/>
+              <a:buFontTx/>
+              <a:buNone/>
+            </a:pPr>
+            <a:r>
+              <a:rPr lang="en-US" altLang="en-US" sz="1400" b="1" dirty="0"/>
+              <a:t>    print(apply(7))</a:t>
             </a:r>
           </a:p>
           <a:p>
@@ -29057,8 +29071,8 @@
         </p:nvSpPr>
         <p:spPr bwMode="auto">
           <a:xfrm>
-            <a:off x="4572000" y="2461950"/>
-            <a:ext cx="3505200" cy="739775"/>
+            <a:off x="4572000" y="2677950"/>
+            <a:ext cx="3505200" cy="523220"/>
           </a:xfrm>
           <a:prstGeom prst="rect">
             <a:avLst/>
@@ -29263,27 +29277,20 @@
               <a:buNone/>
             </a:pPr>
             <a:r>
-              <a:rPr lang="en-US" altLang="en-US" sz="1400">
+              <a:rPr lang="en-US" altLang="en-US" sz="1400" i="1" dirty="0">
                 <a:latin typeface="Arial" panose="020B0604020202020204" pitchFamily="34" charset="0"/>
                 <a:cs typeface="Arial" panose="020B0604020202020204" pitchFamily="34" charset="0"/>
               </a:rPr>
-              <a:t>The first argument </a:t>
-            </a:r>
-            <a:r>
-              <a:rPr lang="en-US" altLang="en-US" sz="1400" i="1">
+              <a:t>apply() </a:t>
+            </a:r>
+            <a:r>
+              <a:rPr lang="en-US" altLang="en-US" sz="1400" dirty="0">
                 <a:latin typeface="Arial" panose="020B0604020202020204" pitchFamily="34" charset="0"/>
                 <a:cs typeface="Arial" panose="020B0604020202020204" pitchFamily="34" charset="0"/>
               </a:rPr>
-              <a:t>apply() </a:t>
-            </a:r>
-            <a:r>
-              <a:rPr lang="en-US" altLang="en-US" sz="1400">
-                <a:latin typeface="Arial" panose="020B0604020202020204" pitchFamily="34" charset="0"/>
-                <a:cs typeface="Arial" panose="020B0604020202020204" pitchFamily="34" charset="0"/>
-              </a:rPr>
-              <a:t>is an unnamed function that takes one input and returns the input multiplied by four.</a:t>
-            </a:r>
-            <a:endParaRPr lang="en-US" altLang="en-US" sz="1400">
+              <a:t>is a function that takes one input and returns the input multiplied by four.</a:t>
+            </a:r>
+            <a:endParaRPr lang="en-US" altLang="en-US" sz="1400" dirty="0">
               <a:latin typeface="Times New Roman" panose="02020603050405020304" pitchFamily="18" charset="0"/>
               <a:cs typeface="Arial" panose="020B0604020202020204" pitchFamily="34" charset="0"/>
             </a:endParaRPr>

</xml_diff>

<commit_message>
changed the infinity loop, added contact in schedule file
</commit_message>
<xml_diff>
--- a/Week1/02-python - DS, function.pptx
+++ b/Week1/02-python - DS, function.pptx
@@ -5,7 +5,7 @@
     <p:sldMasterId id="2147483649" r:id="rId1"/>
   </p:sldMasterIdLst>
   <p:notesMasterIdLst>
-    <p:notesMasterId r:id="rId40"/>
+    <p:notesMasterId r:id="rId41"/>
   </p:notesMasterIdLst>
   <p:sldIdLst>
     <p:sldId id="456" r:id="rId2"/>
@@ -43,9 +43,10 @@
     <p:sldId id="446" r:id="rId34"/>
     <p:sldId id="469" r:id="rId35"/>
     <p:sldId id="401" r:id="rId36"/>
-    <p:sldId id="470" r:id="rId37"/>
-    <p:sldId id="471" r:id="rId38"/>
-    <p:sldId id="472" r:id="rId39"/>
+    <p:sldId id="474" r:id="rId37"/>
+    <p:sldId id="470" r:id="rId38"/>
+    <p:sldId id="471" r:id="rId39"/>
+    <p:sldId id="472" r:id="rId40"/>
   </p:sldIdLst>
   <p:sldSz cx="9144000" cy="6858000" type="screen4x3"/>
   <p:notesSz cx="6858000" cy="9144000"/>
@@ -29324,6 +29325,69 @@
       </p:grpSpPr>
       <p:sp>
         <p:nvSpPr>
+          <p:cNvPr id="2" name="Title 1">
+            <a:extLst>
+              <a:ext uri="{FF2B5EF4-FFF2-40B4-BE49-F238E27FC236}">
+                <a16:creationId xmlns:a16="http://schemas.microsoft.com/office/drawing/2014/main" id="{09E256EE-2794-A94E-BBE7-6926EFE0C4D0}"/>
+              </a:ext>
+            </a:extLst>
+          </p:cNvPr>
+          <p:cNvSpPr>
+            <a:spLocks noGrp="1"/>
+          </p:cNvSpPr>
+          <p:nvPr>
+            <p:ph type="title"/>
+          </p:nvPr>
+        </p:nvSpPr>
+        <p:spPr>
+          <a:xfrm>
+            <a:off x="838200" y="2514600"/>
+            <a:ext cx="7772400" cy="1143000"/>
+          </a:xfrm>
+        </p:spPr>
+        <p:txBody>
+          <a:bodyPr/>
+          <a:lstStyle/>
+          <a:p>
+            <a:r>
+              <a:rPr lang="en-US" dirty="0"/>
+              <a:t>Optional</a:t>
+            </a:r>
+          </a:p>
+        </p:txBody>
+      </p:sp>
+    </p:spTree>
+    <p:extLst>
+      <p:ext uri="{BB962C8B-B14F-4D97-AF65-F5344CB8AC3E}">
+        <p14:creationId xmlns:p14="http://schemas.microsoft.com/office/powerpoint/2010/main" val="1233957874"/>
+      </p:ext>
+    </p:extLst>
+  </p:cSld>
+  <p:clrMapOvr>
+    <a:masterClrMapping/>
+  </p:clrMapOvr>
+</p:sld>
+</file>
+
+<file path=ppt/slides/slide37.xml><?xml version="1.0" encoding="utf-8"?>
+<p:sld xmlns:a="http://schemas.openxmlformats.org/drawingml/2006/main" xmlns:r="http://schemas.openxmlformats.org/officeDocument/2006/relationships" xmlns:p="http://schemas.openxmlformats.org/presentationml/2006/main">
+  <p:cSld>
+    <p:spTree>
+      <p:nvGrpSpPr>
+        <p:cNvPr id="1" name=""/>
+        <p:cNvGrpSpPr/>
+        <p:nvPr/>
+      </p:nvGrpSpPr>
+      <p:grpSpPr>
+        <a:xfrm>
+          <a:off x="0" y="0"/>
+          <a:ext cx="0" cy="0"/>
+          <a:chOff x="0" y="0"/>
+          <a:chExt cx="0" cy="0"/>
+        </a:xfrm>
+      </p:grpSpPr>
+      <p:sp>
+        <p:nvSpPr>
           <p:cNvPr id="2" name="Title 1"/>
           <p:cNvSpPr>
             <a:spLocks noGrp="1"/>
@@ -29758,7 +29822,7 @@
 </p:sld>
 </file>
 
-<file path=ppt/slides/slide37.xml><?xml version="1.0" encoding="utf-8"?>
+<file path=ppt/slides/slide38.xml><?xml version="1.0" encoding="utf-8"?>
 <p:sld xmlns:a="http://schemas.openxmlformats.org/drawingml/2006/main" xmlns:r="http://schemas.openxmlformats.org/officeDocument/2006/relationships" xmlns:p="http://schemas.openxmlformats.org/presentationml/2006/main">
   <p:cSld>
     <p:spTree>
@@ -30000,7 +30064,7 @@
 </p:sld>
 </file>
 
-<file path=ppt/slides/slide38.xml><?xml version="1.0" encoding="utf-8"?>
+<file path=ppt/slides/slide39.xml><?xml version="1.0" encoding="utf-8"?>
 <p:sld xmlns:a="http://schemas.openxmlformats.org/drawingml/2006/main" xmlns:r="http://schemas.openxmlformats.org/officeDocument/2006/relationships" xmlns:p="http://schemas.openxmlformats.org/presentationml/2006/main">
   <p:cSld>
     <p:spTree>

</xml_diff>